<commit_message>
Finish edit P1C3 break concept.
</commit_message>
<xml_diff>
--- a/resources/ppt-slides/control-flow-break.pptx
+++ b/resources/ppt-slides/control-flow-break.pptx
@@ -251,7 +251,7 @@
           <a:p>
             <a:fld id="{964302DC-9F53-934F-AE4D-0F1F197008C1}" type="datetimeFigureOut">
               <a:rPr lang="en-US" smtClean="0"/>
-              <a:t>12/7/23</a:t>
+              <a:t>2/12/24</a:t>
             </a:fld>
             <a:endParaRPr lang="en-US"/>
           </a:p>
@@ -421,7 +421,7 @@
           <a:p>
             <a:fld id="{964302DC-9F53-934F-AE4D-0F1F197008C1}" type="datetimeFigureOut">
               <a:rPr lang="en-US" smtClean="0"/>
-              <a:t>12/7/23</a:t>
+              <a:t>2/12/24</a:t>
             </a:fld>
             <a:endParaRPr lang="en-US"/>
           </a:p>
@@ -601,7 +601,7 @@
           <a:p>
             <a:fld id="{964302DC-9F53-934F-AE4D-0F1F197008C1}" type="datetimeFigureOut">
               <a:rPr lang="en-US" smtClean="0"/>
-              <a:t>12/7/23</a:t>
+              <a:t>2/12/24</a:t>
             </a:fld>
             <a:endParaRPr lang="en-US"/>
           </a:p>
@@ -771,7 +771,7 @@
           <a:p>
             <a:fld id="{964302DC-9F53-934F-AE4D-0F1F197008C1}" type="datetimeFigureOut">
               <a:rPr lang="en-US" smtClean="0"/>
-              <a:t>12/7/23</a:t>
+              <a:t>2/12/24</a:t>
             </a:fld>
             <a:endParaRPr lang="en-US"/>
           </a:p>
@@ -1015,7 +1015,7 @@
           <a:p>
             <a:fld id="{964302DC-9F53-934F-AE4D-0F1F197008C1}" type="datetimeFigureOut">
               <a:rPr lang="en-US" smtClean="0"/>
-              <a:t>12/7/23</a:t>
+              <a:t>2/12/24</a:t>
             </a:fld>
             <a:endParaRPr lang="en-US"/>
           </a:p>
@@ -1247,7 +1247,7 @@
           <a:p>
             <a:fld id="{964302DC-9F53-934F-AE4D-0F1F197008C1}" type="datetimeFigureOut">
               <a:rPr lang="en-US" smtClean="0"/>
-              <a:t>12/7/23</a:t>
+              <a:t>2/12/24</a:t>
             </a:fld>
             <a:endParaRPr lang="en-US"/>
           </a:p>
@@ -1614,7 +1614,7 @@
           <a:p>
             <a:fld id="{964302DC-9F53-934F-AE4D-0F1F197008C1}" type="datetimeFigureOut">
               <a:rPr lang="en-US" smtClean="0"/>
-              <a:t>12/7/23</a:t>
+              <a:t>2/12/24</a:t>
             </a:fld>
             <a:endParaRPr lang="en-US"/>
           </a:p>
@@ -1732,7 +1732,7 @@
           <a:p>
             <a:fld id="{964302DC-9F53-934F-AE4D-0F1F197008C1}" type="datetimeFigureOut">
               <a:rPr lang="en-US" smtClean="0"/>
-              <a:t>12/7/23</a:t>
+              <a:t>2/12/24</a:t>
             </a:fld>
             <a:endParaRPr lang="en-US"/>
           </a:p>
@@ -1827,7 +1827,7 @@
           <a:p>
             <a:fld id="{964302DC-9F53-934F-AE4D-0F1F197008C1}" type="datetimeFigureOut">
               <a:rPr lang="en-US" smtClean="0"/>
-              <a:t>12/7/23</a:t>
+              <a:t>2/12/24</a:t>
             </a:fld>
             <a:endParaRPr lang="en-US"/>
           </a:p>
@@ -2104,7 +2104,7 @@
           <a:p>
             <a:fld id="{964302DC-9F53-934F-AE4D-0F1F197008C1}" type="datetimeFigureOut">
               <a:rPr lang="en-US" smtClean="0"/>
-              <a:t>12/7/23</a:t>
+              <a:t>2/12/24</a:t>
             </a:fld>
             <a:endParaRPr lang="en-US"/>
           </a:p>
@@ -2361,7 +2361,7 @@
           <a:p>
             <a:fld id="{964302DC-9F53-934F-AE4D-0F1F197008C1}" type="datetimeFigureOut">
               <a:rPr lang="en-US" smtClean="0"/>
-              <a:t>12/7/23</a:t>
+              <a:t>2/12/24</a:t>
             </a:fld>
             <a:endParaRPr lang="en-US"/>
           </a:p>
@@ -2426,9 +2426,18 @@
 <p:sldMaster xmlns:a="http://schemas.openxmlformats.org/drawingml/2006/main" xmlns:r="http://schemas.openxmlformats.org/officeDocument/2006/relationships" xmlns:p="http://schemas.openxmlformats.org/presentationml/2006/main">
   <p:cSld>
     <p:bg>
-      <p:bgRef idx="1001">
-        <a:schemeClr val="bg1"/>
-      </p:bgRef>
+      <p:bgPr>
+        <a:blipFill dpi="0" rotWithShape="1">
+          <a:blip r:embed="rId13">
+            <a:lum/>
+          </a:blip>
+          <a:srcRect/>
+          <a:stretch>
+            <a:fillRect/>
+          </a:stretch>
+        </a:blipFill>
+        <a:effectLst/>
+      </p:bgPr>
     </p:bg>
     <p:spTree>
       <p:nvGrpSpPr>
@@ -2574,7 +2583,7 @@
           <a:p>
             <a:fld id="{964302DC-9F53-934F-AE4D-0F1F197008C1}" type="datetimeFigureOut">
               <a:rPr lang="en-US" smtClean="0"/>
-              <a:t>12/7/23</a:t>
+              <a:t>2/12/24</a:t>
             </a:fld>
             <a:endParaRPr lang="en-US"/>
           </a:p>
@@ -2965,20 +2974,6 @@
 <file path=ppt/slides/slide1.xml><?xml version="1.0" encoding="utf-8"?>
 <p:sld xmlns:a="http://schemas.openxmlformats.org/drawingml/2006/main" xmlns:r="http://schemas.openxmlformats.org/officeDocument/2006/relationships" xmlns:p="http://schemas.openxmlformats.org/presentationml/2006/main">
   <p:cSld>
-    <p:bg>
-      <p:bgPr>
-        <a:blipFill dpi="0" rotWithShape="1">
-          <a:blip r:embed="rId2">
-            <a:lum/>
-          </a:blip>
-          <a:srcRect/>
-          <a:stretch>
-            <a:fillRect/>
-          </a:stretch>
-        </a:blipFill>
-        <a:effectLst/>
-      </p:bgPr>
-    </p:bg>
     <p:spTree>
       <p:nvGrpSpPr>
         <p:cNvPr id="1" name=""/>
@@ -3121,7 +3116,7 @@
                     </a:schemeClr>
                   </a:solidFill>
                 </a:rPr>
-                <a:t>while ( !</a:t>
+                <a:t>while (!</a:t>
               </a:r>
               <a:r>
                 <a:rPr lang="en-AU" sz="1600" dirty="0" err="1">
@@ -3210,7 +3205,7 @@
               <p:nvPr/>
             </p:nvPicPr>
             <p:blipFill>
-              <a:blip r:embed="rId3">
+              <a:blip r:embed="rId2">
                 <a:alphaModFix/>
               </a:blip>
               <a:stretch>
@@ -5060,7 +5055,7 @@
             <p:nvPr/>
           </p:nvPicPr>
           <p:blipFill>
-            <a:blip r:embed="rId4">
+            <a:blip r:embed="rId3">
               <a:alphaModFix amt="30000"/>
             </a:blip>
             <a:stretch>
@@ -5250,20 +5245,6 @@
 <file path=ppt/slides/slide2.xml><?xml version="1.0" encoding="utf-8"?>
 <p:sld xmlns:a="http://schemas.openxmlformats.org/drawingml/2006/main" xmlns:r="http://schemas.openxmlformats.org/officeDocument/2006/relationships" xmlns:p="http://schemas.openxmlformats.org/presentationml/2006/main">
   <p:cSld>
-    <p:bg>
-      <p:bgPr>
-        <a:blipFill dpi="0" rotWithShape="1">
-          <a:blip r:embed="rId2">
-            <a:lum/>
-          </a:blip>
-          <a:srcRect/>
-          <a:stretch>
-            <a:fillRect/>
-          </a:stretch>
-        </a:blipFill>
-        <a:effectLst/>
-      </p:bgPr>
-    </p:bg>
     <p:spTree>
       <p:nvGrpSpPr>
         <p:cNvPr id="1" name=""/>
@@ -5332,7 +5313,7 @@
               </a:pPr>
               <a:r>
                 <a:rPr lang="en-AU" sz="1200" dirty="0"/>
-                <a:t>while ( !</a:t>
+                <a:t>while (!</a:t>
               </a:r>
               <a:r>
                 <a:rPr lang="en-AU" sz="1200" dirty="0" err="1"/>
@@ -5372,7 +5353,7 @@
                     </a:schemeClr>
                   </a:solidFill>
                 </a:rPr>
-                <a:t>    </a:t>
+                <a:t>      </a:t>
               </a:r>
               <a:r>
                 <a:rPr lang="en-AU" sz="1200" dirty="0" err="1">
@@ -5547,7 +5528,7 @@
                     </a:schemeClr>
                   </a:solidFill>
                 </a:rPr>
-                <a:t>    </a:t>
+                <a:t>      </a:t>
               </a:r>
               <a:r>
                 <a:rPr lang="en-AU" sz="1200" dirty="0" err="1">
@@ -5583,7 +5564,7 @@
                     </a:schemeClr>
                   </a:solidFill>
                 </a:rPr>
-                <a:t>    </a:t>
+                <a:t>      </a:t>
               </a:r>
               <a:r>
                 <a:rPr lang="en-AU" sz="1200" dirty="0" err="1">
@@ -5632,7 +5613,7 @@
                     </a:schemeClr>
                   </a:solidFill>
                 </a:rPr>
-                <a:t>    if (</a:t>
+                <a:t>      if (</a:t>
               </a:r>
               <a:r>
                 <a:rPr lang="en-AU" sz="1200" dirty="0" err="1">
@@ -5688,7 +5669,7 @@
                     </a:schemeClr>
                   </a:solidFill>
                 </a:rPr>
-                <a:t>    {</a:t>
+                <a:t>      {</a:t>
               </a:r>
             </a:p>
             <a:p>
@@ -5704,7 +5685,7 @@
                     </a:schemeClr>
                   </a:solidFill>
                 </a:rPr>
-                <a:t>        break;  // end the loop</a:t>
+                <a:t>          break;  // end the loop</a:t>
               </a:r>
             </a:p>
             <a:p>
@@ -5720,7 +5701,7 @@
                     </a:schemeClr>
                   </a:solidFill>
                 </a:rPr>
-                <a:t>    }</a:t>
+                <a:t>      }</a:t>
               </a:r>
             </a:p>
             <a:p>
@@ -7602,7 +7583,7 @@
             <p:nvPr/>
           </p:nvPicPr>
           <p:blipFill>
-            <a:blip r:embed="rId3">
+            <a:blip r:embed="rId2">
               <a:alphaModFix amt="30000"/>
             </a:blip>
             <a:stretch>
@@ -7791,7 +7772,7 @@
           <p:nvPr/>
         </p:nvPicPr>
         <p:blipFill>
-          <a:blip r:embed="rId4">
+          <a:blip r:embed="rId3">
             <a:alphaModFix/>
           </a:blip>
           <a:stretch>
@@ -7824,20 +7805,6 @@
 <file path=ppt/slides/slide3.xml><?xml version="1.0" encoding="utf-8"?>
 <p:sld xmlns:a="http://schemas.openxmlformats.org/drawingml/2006/main" xmlns:r="http://schemas.openxmlformats.org/officeDocument/2006/relationships" xmlns:p="http://schemas.openxmlformats.org/presentationml/2006/main">
   <p:cSld>
-    <p:bg>
-      <p:bgPr>
-        <a:blipFill dpi="0" rotWithShape="1">
-          <a:blip r:embed="rId2">
-            <a:lum/>
-          </a:blip>
-          <a:srcRect/>
-          <a:stretch>
-            <a:fillRect/>
-          </a:stretch>
-        </a:blipFill>
-        <a:effectLst/>
-      </p:bgPr>
-    </p:bg>
     <p:spTree>
       <p:nvGrpSpPr>
         <p:cNvPr id="1" name=""/>
@@ -7912,7 +7879,7 @@
                     </a:schemeClr>
                   </a:solidFill>
                 </a:rPr>
-                <a:t>while ( !</a:t>
+                <a:t>while (!</a:t>
               </a:r>
               <a:r>
                 <a:rPr lang="en-AU" sz="1200" dirty="0" err="1">
@@ -7958,7 +7925,7 @@
               </a:pPr>
               <a:r>
                 <a:rPr lang="en-AU" sz="1200" dirty="0"/>
-                <a:t>    </a:t>
+                <a:t>      </a:t>
               </a:r>
               <a:r>
                 <a:rPr lang="en-AU" sz="1200" dirty="0" err="1"/>
@@ -8031,7 +7998,7 @@
               </a:pPr>
               <a:r>
                 <a:rPr lang="en-AU" sz="1200" dirty="0"/>
-                <a:t>    </a:t>
+                <a:t>      </a:t>
               </a:r>
               <a:r>
                 <a:rPr lang="en-AU" sz="1200" dirty="0" err="1"/>
@@ -8049,7 +8016,7 @@
               </a:pPr>
               <a:r>
                 <a:rPr lang="en-AU" sz="1200" dirty="0"/>
-                <a:t>    </a:t>
+                <a:t>      </a:t>
               </a:r>
               <a:r>
                 <a:rPr lang="en-AU" sz="1200" dirty="0" err="1"/>
@@ -8086,7 +8053,7 @@
                     </a:schemeClr>
                   </a:solidFill>
                 </a:rPr>
-                <a:t>    if (</a:t>
+                <a:t>      if (</a:t>
               </a:r>
               <a:r>
                 <a:rPr lang="en-AU" sz="1200" dirty="0" err="1">
@@ -8142,7 +8109,7 @@
                     </a:schemeClr>
                   </a:solidFill>
                 </a:rPr>
-                <a:t>    {</a:t>
+                <a:t>      {</a:t>
               </a:r>
             </a:p>
             <a:p>
@@ -8158,7 +8125,7 @@
                     </a:schemeClr>
                   </a:solidFill>
                 </a:rPr>
-                <a:t>        break;  // end the loop</a:t>
+                <a:t>          break;  // end the loop</a:t>
               </a:r>
             </a:p>
             <a:p>
@@ -8174,7 +8141,7 @@
                     </a:schemeClr>
                   </a:solidFill>
                 </a:rPr>
-                <a:t>    }</a:t>
+                <a:t>      }</a:t>
               </a:r>
             </a:p>
             <a:p>
@@ -10043,7 +10010,7 @@
             <p:nvPr/>
           </p:nvPicPr>
           <p:blipFill>
-            <a:blip r:embed="rId3">
+            <a:blip r:embed="rId2">
               <a:alphaModFix amt="30000"/>
             </a:blip>
             <a:stretch>
@@ -10232,7 +10199,7 @@
           <p:nvPr/>
         </p:nvPicPr>
         <p:blipFill>
-          <a:blip r:embed="rId4">
+          <a:blip r:embed="rId3">
             <a:alphaModFix/>
           </a:blip>
           <a:stretch>
@@ -10265,20 +10232,6 @@
 <file path=ppt/slides/slide4.xml><?xml version="1.0" encoding="utf-8"?>
 <p:sld xmlns:a="http://schemas.openxmlformats.org/drawingml/2006/main" xmlns:r="http://schemas.openxmlformats.org/officeDocument/2006/relationships" xmlns:p="http://schemas.openxmlformats.org/presentationml/2006/main">
   <p:cSld>
-    <p:bg>
-      <p:bgPr>
-        <a:blipFill dpi="0" rotWithShape="1">
-          <a:blip r:embed="rId2">
-            <a:lum/>
-          </a:blip>
-          <a:srcRect/>
-          <a:stretch>
-            <a:fillRect/>
-          </a:stretch>
-        </a:blipFill>
-        <a:effectLst/>
-      </p:bgPr>
-    </p:bg>
     <p:spTree>
       <p:nvGrpSpPr>
         <p:cNvPr id="1" name=""/>
@@ -10353,7 +10306,7 @@
                     </a:schemeClr>
                   </a:solidFill>
                 </a:rPr>
-                <a:t>while ( !</a:t>
+                <a:t>while (!</a:t>
               </a:r>
               <a:r>
                 <a:rPr lang="en-AU" sz="1200" dirty="0" err="1">
@@ -10405,7 +10358,7 @@
                     </a:schemeClr>
                   </a:solidFill>
                 </a:rPr>
-                <a:t>    </a:t>
+                <a:t>      </a:t>
               </a:r>
               <a:r>
                 <a:rPr lang="en-AU" sz="1200" dirty="0" err="1">
@@ -10580,7 +10533,7 @@
                     </a:schemeClr>
                   </a:solidFill>
                 </a:rPr>
-                <a:t>    </a:t>
+                <a:t>      </a:t>
               </a:r>
               <a:r>
                 <a:rPr lang="en-AU" sz="1200" dirty="0" err="1">
@@ -10616,7 +10569,7 @@
                     </a:schemeClr>
                   </a:solidFill>
                 </a:rPr>
-                <a:t>    </a:t>
+                <a:t>      </a:t>
               </a:r>
               <a:r>
                 <a:rPr lang="en-AU" sz="1200" dirty="0" err="1">
@@ -10659,7 +10612,7 @@
               </a:pPr>
               <a:r>
                 <a:rPr lang="en-AU" sz="1200" dirty="0"/>
-                <a:t>    if (</a:t>
+                <a:t>      if (</a:t>
               </a:r>
               <a:r>
                 <a:rPr lang="en-AU" sz="1200" dirty="0" err="1"/>
@@ -10691,7 +10644,7 @@
                     </a:schemeClr>
                   </a:solidFill>
                 </a:rPr>
-                <a:t>    {</a:t>
+                <a:t>      {</a:t>
               </a:r>
             </a:p>
             <a:p>
@@ -10707,7 +10660,7 @@
                     </a:schemeClr>
                   </a:solidFill>
                 </a:rPr>
-                <a:t>        break;  // end the loop</a:t>
+                <a:t>          break;  // end the loop</a:t>
               </a:r>
             </a:p>
             <a:p>
@@ -10723,7 +10676,7 @@
                     </a:schemeClr>
                   </a:solidFill>
                 </a:rPr>
-                <a:t>    }</a:t>
+                <a:t>      }</a:t>
               </a:r>
             </a:p>
             <a:p>
@@ -12572,7 +12525,7 @@
             <a:p>
               <a:r>
                 <a:rPr lang="en-US" dirty="0"/>
-                <a:t>10,12,4</a:t>
+                <a:t>12,4</a:t>
               </a:r>
             </a:p>
           </p:txBody>
@@ -12592,7 +12545,7 @@
             <p:nvPr/>
           </p:nvPicPr>
           <p:blipFill>
-            <a:blip r:embed="rId3">
+            <a:blip r:embed="rId2">
               <a:alphaModFix amt="30000"/>
             </a:blip>
             <a:stretch>
@@ -12781,7 +12734,7 @@
           <p:nvPr/>
         </p:nvPicPr>
         <p:blipFill>
-          <a:blip r:embed="rId4">
+          <a:blip r:embed="rId3">
             <a:alphaModFix/>
           </a:blip>
           <a:stretch>
@@ -12814,20 +12767,6 @@
 <file path=ppt/slides/slide5.xml><?xml version="1.0" encoding="utf-8"?>
 <p:sld xmlns:a="http://schemas.openxmlformats.org/drawingml/2006/main" xmlns:r="http://schemas.openxmlformats.org/officeDocument/2006/relationships" xmlns:p="http://schemas.openxmlformats.org/presentationml/2006/main">
   <p:cSld>
-    <p:bg>
-      <p:bgPr>
-        <a:blipFill dpi="0" rotWithShape="1">
-          <a:blip r:embed="rId2">
-            <a:lum/>
-          </a:blip>
-          <a:srcRect/>
-          <a:stretch>
-            <a:fillRect/>
-          </a:stretch>
-        </a:blipFill>
-        <a:effectLst/>
-      </p:bgPr>
-    </p:bg>
     <p:spTree>
       <p:nvGrpSpPr>
         <p:cNvPr id="1" name=""/>
@@ -12896,7 +12835,7 @@
               </a:pPr>
               <a:r>
                 <a:rPr lang="en-AU" sz="1200" dirty="0"/>
-                <a:t>while ( !</a:t>
+                <a:t>while (!</a:t>
               </a:r>
               <a:r>
                 <a:rPr lang="en-AU" sz="1200" dirty="0" err="1"/>
@@ -12936,7 +12875,7 @@
                     </a:schemeClr>
                   </a:solidFill>
                 </a:rPr>
-                <a:t>    </a:t>
+                <a:t>      </a:t>
               </a:r>
               <a:r>
                 <a:rPr lang="en-AU" sz="1200" dirty="0" err="1">
@@ -13111,7 +13050,7 @@
                     </a:schemeClr>
                   </a:solidFill>
                 </a:rPr>
-                <a:t>    </a:t>
+                <a:t>      </a:t>
               </a:r>
               <a:r>
                 <a:rPr lang="en-AU" sz="1200" dirty="0" err="1">
@@ -13147,7 +13086,7 @@
                     </a:schemeClr>
                   </a:solidFill>
                 </a:rPr>
-                <a:t>    </a:t>
+                <a:t>      </a:t>
               </a:r>
               <a:r>
                 <a:rPr lang="en-AU" sz="1200" dirty="0" err="1">
@@ -13196,7 +13135,7 @@
                     </a:schemeClr>
                   </a:solidFill>
                 </a:rPr>
-                <a:t>    if (</a:t>
+                <a:t>      if (</a:t>
               </a:r>
               <a:r>
                 <a:rPr lang="en-AU" sz="1200" dirty="0" err="1">
@@ -13252,7 +13191,7 @@
                     </a:schemeClr>
                   </a:solidFill>
                 </a:rPr>
-                <a:t>    {</a:t>
+                <a:t>      {</a:t>
               </a:r>
             </a:p>
             <a:p>
@@ -13268,7 +13207,7 @@
                     </a:schemeClr>
                   </a:solidFill>
                 </a:rPr>
-                <a:t>        break;  // end the loop</a:t>
+                <a:t>          break;  // end the loop</a:t>
               </a:r>
             </a:p>
             <a:p>
@@ -13284,7 +13223,7 @@
                     </a:schemeClr>
                   </a:solidFill>
                 </a:rPr>
-                <a:t>    }</a:t>
+                <a:t>      }</a:t>
               </a:r>
             </a:p>
             <a:p>
@@ -15153,7 +15092,7 @@
             <p:nvPr/>
           </p:nvPicPr>
           <p:blipFill>
-            <a:blip r:embed="rId3">
+            <a:blip r:embed="rId2">
               <a:alphaModFix amt="30000"/>
             </a:blip>
             <a:stretch>
@@ -15342,7 +15281,7 @@
           <p:nvPr/>
         </p:nvPicPr>
         <p:blipFill>
-          <a:blip r:embed="rId4">
+          <a:blip r:embed="rId3">
             <a:alphaModFix/>
           </a:blip>
           <a:stretch>
@@ -15375,20 +15314,6 @@
 <file path=ppt/slides/slide6.xml><?xml version="1.0" encoding="utf-8"?>
 <p:sld xmlns:a="http://schemas.openxmlformats.org/drawingml/2006/main" xmlns:r="http://schemas.openxmlformats.org/officeDocument/2006/relationships" xmlns:p="http://schemas.openxmlformats.org/presentationml/2006/main">
   <p:cSld>
-    <p:bg>
-      <p:bgPr>
-        <a:blipFill dpi="0" rotWithShape="1">
-          <a:blip r:embed="rId2">
-            <a:lum/>
-          </a:blip>
-          <a:srcRect/>
-          <a:stretch>
-            <a:fillRect/>
-          </a:stretch>
-        </a:blipFill>
-        <a:effectLst/>
-      </p:bgPr>
-    </p:bg>
     <p:spTree>
       <p:nvGrpSpPr>
         <p:cNvPr id="1" name=""/>
@@ -15463,7 +15388,7 @@
                     </a:schemeClr>
                   </a:solidFill>
                 </a:rPr>
-                <a:t>while ( !</a:t>
+                <a:t>while (!</a:t>
               </a:r>
               <a:r>
                 <a:rPr lang="en-AU" sz="1200" dirty="0" err="1">
@@ -15509,7 +15434,7 @@
               </a:pPr>
               <a:r>
                 <a:rPr lang="en-AU" sz="1200" dirty="0"/>
-                <a:t>    </a:t>
+                <a:t>      </a:t>
               </a:r>
               <a:r>
                 <a:rPr lang="en-AU" sz="1200" dirty="0" err="1"/>
@@ -15582,7 +15507,7 @@
               </a:pPr>
               <a:r>
                 <a:rPr lang="en-AU" sz="1200" dirty="0"/>
-                <a:t>    </a:t>
+                <a:t>      </a:t>
               </a:r>
               <a:r>
                 <a:rPr lang="en-AU" sz="1200" dirty="0" err="1"/>
@@ -15600,7 +15525,7 @@
               </a:pPr>
               <a:r>
                 <a:rPr lang="en-AU" sz="1200" dirty="0"/>
-                <a:t>    </a:t>
+                <a:t>      </a:t>
               </a:r>
               <a:r>
                 <a:rPr lang="en-AU" sz="1200" dirty="0" err="1"/>
@@ -15637,7 +15562,7 @@
                     </a:schemeClr>
                   </a:solidFill>
                 </a:rPr>
-                <a:t>    if (</a:t>
+                <a:t>      if (</a:t>
               </a:r>
               <a:r>
                 <a:rPr lang="en-AU" sz="1200" dirty="0" err="1">
@@ -15693,7 +15618,7 @@
                     </a:schemeClr>
                   </a:solidFill>
                 </a:rPr>
-                <a:t>    {</a:t>
+                <a:t>      {</a:t>
               </a:r>
             </a:p>
             <a:p>
@@ -15709,7 +15634,7 @@
                     </a:schemeClr>
                   </a:solidFill>
                 </a:rPr>
-                <a:t>        break;  // end the loop</a:t>
+                <a:t>          break;  // end the loop</a:t>
               </a:r>
             </a:p>
             <a:p>
@@ -15725,7 +15650,7 @@
                     </a:schemeClr>
                   </a:solidFill>
                 </a:rPr>
-                <a:t>    }</a:t>
+                <a:t>      }</a:t>
               </a:r>
             </a:p>
             <a:p>
@@ -17607,7 +17532,7 @@
             <p:nvPr/>
           </p:nvPicPr>
           <p:blipFill>
-            <a:blip r:embed="rId3">
+            <a:blip r:embed="rId2">
               <a:alphaModFix amt="30000"/>
             </a:blip>
             <a:stretch>
@@ -17796,7 +17721,7 @@
           <p:nvPr/>
         </p:nvPicPr>
         <p:blipFill>
-          <a:blip r:embed="rId4">
+          <a:blip r:embed="rId3">
             <a:alphaModFix/>
           </a:blip>
           <a:stretch>
@@ -17829,20 +17754,6 @@
 <file path=ppt/slides/slide7.xml><?xml version="1.0" encoding="utf-8"?>
 <p:sld xmlns:a="http://schemas.openxmlformats.org/drawingml/2006/main" xmlns:r="http://schemas.openxmlformats.org/officeDocument/2006/relationships" xmlns:p="http://schemas.openxmlformats.org/presentationml/2006/main">
   <p:cSld>
-    <p:bg>
-      <p:bgPr>
-        <a:blipFill dpi="0" rotWithShape="1">
-          <a:blip r:embed="rId2">
-            <a:lum/>
-          </a:blip>
-          <a:srcRect/>
-          <a:stretch>
-            <a:fillRect/>
-          </a:stretch>
-        </a:blipFill>
-        <a:effectLst/>
-      </p:bgPr>
-    </p:bg>
     <p:spTree>
       <p:nvGrpSpPr>
         <p:cNvPr id="1" name=""/>
@@ -17917,7 +17828,7 @@
                     </a:schemeClr>
                   </a:solidFill>
                 </a:rPr>
-                <a:t>while ( !</a:t>
+                <a:t>while (!</a:t>
               </a:r>
               <a:r>
                 <a:rPr lang="en-AU" sz="1200" dirty="0" err="1">
@@ -17969,7 +17880,7 @@
                     </a:schemeClr>
                   </a:solidFill>
                 </a:rPr>
-                <a:t>    </a:t>
+                <a:t>      </a:t>
               </a:r>
               <a:r>
                 <a:rPr lang="en-AU" sz="1200" dirty="0" err="1">
@@ -18144,7 +18055,7 @@
                     </a:schemeClr>
                   </a:solidFill>
                 </a:rPr>
-                <a:t>    </a:t>
+                <a:t>      </a:t>
               </a:r>
               <a:r>
                 <a:rPr lang="en-AU" sz="1200" dirty="0" err="1">
@@ -18180,7 +18091,7 @@
                     </a:schemeClr>
                   </a:solidFill>
                 </a:rPr>
-                <a:t>    </a:t>
+                <a:t>      </a:t>
               </a:r>
               <a:r>
                 <a:rPr lang="en-AU" sz="1200" dirty="0" err="1">
@@ -18223,7 +18134,7 @@
               </a:pPr>
               <a:r>
                 <a:rPr lang="en-AU" sz="1200" dirty="0"/>
-                <a:t>    if (</a:t>
+                <a:t>      if (</a:t>
               </a:r>
               <a:r>
                 <a:rPr lang="en-AU" sz="1200" dirty="0" err="1"/>
@@ -18255,7 +18166,7 @@
                     </a:schemeClr>
                   </a:solidFill>
                 </a:rPr>
-                <a:t>    {</a:t>
+                <a:t>      {</a:t>
               </a:r>
             </a:p>
             <a:p>
@@ -18271,7 +18182,7 @@
                     </a:schemeClr>
                   </a:solidFill>
                 </a:rPr>
-                <a:t>        break;  // end the loop</a:t>
+                <a:t>          break;  // end the loop</a:t>
               </a:r>
             </a:p>
             <a:p>
@@ -18287,7 +18198,7 @@
                     </a:schemeClr>
                   </a:solidFill>
                 </a:rPr>
-                <a:t>    }</a:t>
+                <a:t>      }</a:t>
               </a:r>
             </a:p>
             <a:p>
@@ -20156,7 +20067,7 @@
             <p:nvPr/>
           </p:nvPicPr>
           <p:blipFill>
-            <a:blip r:embed="rId3">
+            <a:blip r:embed="rId2">
               <a:alphaModFix amt="30000"/>
             </a:blip>
             <a:stretch>
@@ -20345,7 +20256,7 @@
           <p:nvPr/>
         </p:nvPicPr>
         <p:blipFill>
-          <a:blip r:embed="rId4">
+          <a:blip r:embed="rId3">
             <a:alphaModFix/>
           </a:blip>
           <a:stretch>
@@ -20378,20 +20289,6 @@
 <file path=ppt/slides/slide8.xml><?xml version="1.0" encoding="utf-8"?>
 <p:sld xmlns:a="http://schemas.openxmlformats.org/drawingml/2006/main" xmlns:r="http://schemas.openxmlformats.org/officeDocument/2006/relationships" xmlns:p="http://schemas.openxmlformats.org/presentationml/2006/main">
   <p:cSld>
-    <p:bg>
-      <p:bgPr>
-        <a:blipFill dpi="0" rotWithShape="1">
-          <a:blip r:embed="rId2">
-            <a:lum/>
-          </a:blip>
-          <a:srcRect/>
-          <a:stretch>
-            <a:fillRect/>
-          </a:stretch>
-        </a:blipFill>
-        <a:effectLst/>
-      </p:bgPr>
-    </p:bg>
     <p:spTree>
       <p:nvGrpSpPr>
         <p:cNvPr id="1" name=""/>
@@ -20466,7 +20363,7 @@
                     </a:schemeClr>
                   </a:solidFill>
                 </a:rPr>
-                <a:t>while ( !</a:t>
+                <a:t>while (!</a:t>
               </a:r>
               <a:r>
                 <a:rPr lang="en-AU" sz="1200" dirty="0" err="1">
@@ -20518,7 +20415,7 @@
                     </a:schemeClr>
                   </a:solidFill>
                 </a:rPr>
-                <a:t>    </a:t>
+                <a:t>      </a:t>
               </a:r>
               <a:r>
                 <a:rPr lang="en-AU" sz="1200" dirty="0" err="1">
@@ -20693,7 +20590,7 @@
                     </a:schemeClr>
                   </a:solidFill>
                 </a:rPr>
-                <a:t>    </a:t>
+                <a:t>      </a:t>
               </a:r>
               <a:r>
                 <a:rPr lang="en-AU" sz="1200" dirty="0" err="1">
@@ -20729,7 +20626,7 @@
                     </a:schemeClr>
                   </a:solidFill>
                 </a:rPr>
-                <a:t>    </a:t>
+                <a:t>      </a:t>
               </a:r>
               <a:r>
                 <a:rPr lang="en-AU" sz="1200" dirty="0" err="1">
@@ -20778,7 +20675,7 @@
                     </a:schemeClr>
                   </a:solidFill>
                 </a:rPr>
-                <a:t>    if (</a:t>
+                <a:t>      if (</a:t>
               </a:r>
               <a:r>
                 <a:rPr lang="en-AU" sz="1200" dirty="0" err="1">
@@ -20834,7 +20731,7 @@
                     </a:schemeClr>
                   </a:solidFill>
                 </a:rPr>
-                <a:t>    {</a:t>
+                <a:t>      {</a:t>
               </a:r>
             </a:p>
             <a:p>
@@ -20844,7 +20741,7 @@
               </a:pPr>
               <a:r>
                 <a:rPr lang="en-AU" sz="1200" dirty="0"/>
-                <a:t>        break;  // end the loop</a:t>
+                <a:t>          break;  // end the loop</a:t>
               </a:r>
             </a:p>
             <a:p>
@@ -20860,7 +20757,7 @@
                     </a:schemeClr>
                   </a:solidFill>
                 </a:rPr>
-                <a:t>    }</a:t>
+                <a:t>      }</a:t>
               </a:r>
             </a:p>
             <a:p>
@@ -22733,7 +22630,7 @@
             <p:nvPr/>
           </p:nvPicPr>
           <p:blipFill>
-            <a:blip r:embed="rId3">
+            <a:blip r:embed="rId2">
               <a:alphaModFix amt="30000"/>
             </a:blip>
             <a:stretch>
@@ -22922,7 +22819,7 @@
           <p:nvPr/>
         </p:nvPicPr>
         <p:blipFill>
-          <a:blip r:embed="rId4">
+          <a:blip r:embed="rId3">
             <a:alphaModFix/>
           </a:blip>
           <a:stretch>
@@ -22955,20 +22852,6 @@
 <file path=ppt/slides/slide9.xml><?xml version="1.0" encoding="utf-8"?>
 <p:sld xmlns:a="http://schemas.openxmlformats.org/drawingml/2006/main" xmlns:r="http://schemas.openxmlformats.org/officeDocument/2006/relationships" xmlns:p="http://schemas.openxmlformats.org/presentationml/2006/main">
   <p:cSld>
-    <p:bg>
-      <p:bgPr>
-        <a:blipFill dpi="0" rotWithShape="1">
-          <a:blip r:embed="rId2">
-            <a:lum/>
-          </a:blip>
-          <a:srcRect/>
-          <a:stretch>
-            <a:fillRect/>
-          </a:stretch>
-        </a:blipFill>
-        <a:effectLst/>
-      </p:bgPr>
-    </p:bg>
     <p:spTree>
       <p:nvGrpSpPr>
         <p:cNvPr id="1" name=""/>
@@ -23043,7 +22926,7 @@
                     </a:schemeClr>
                   </a:solidFill>
                 </a:rPr>
-                <a:t>while ( !</a:t>
+                <a:t>while (!</a:t>
               </a:r>
               <a:r>
                 <a:rPr lang="en-AU" sz="1200" dirty="0" err="1">
@@ -23095,7 +22978,7 @@
                     </a:schemeClr>
                   </a:solidFill>
                 </a:rPr>
-                <a:t>    </a:t>
+                <a:t>      </a:t>
               </a:r>
               <a:r>
                 <a:rPr lang="en-AU" sz="1200" dirty="0" err="1">
@@ -23270,7 +23153,7 @@
                     </a:schemeClr>
                   </a:solidFill>
                 </a:rPr>
-                <a:t>    </a:t>
+                <a:t>      </a:t>
               </a:r>
               <a:r>
                 <a:rPr lang="en-AU" sz="1200" dirty="0" err="1">
@@ -23306,7 +23189,7 @@
                     </a:schemeClr>
                   </a:solidFill>
                 </a:rPr>
-                <a:t>    </a:t>
+                <a:t>      </a:t>
               </a:r>
               <a:r>
                 <a:rPr lang="en-AU" sz="1200" dirty="0" err="1">
@@ -23355,7 +23238,7 @@
                     </a:schemeClr>
                   </a:solidFill>
                 </a:rPr>
-                <a:t>    if (</a:t>
+                <a:t>      if (</a:t>
               </a:r>
               <a:r>
                 <a:rPr lang="en-AU" sz="1200" dirty="0" err="1">
@@ -23411,7 +23294,7 @@
                     </a:schemeClr>
                   </a:solidFill>
                 </a:rPr>
-                <a:t>    {</a:t>
+                <a:t>      {</a:t>
               </a:r>
             </a:p>
             <a:p>
@@ -23427,7 +23310,7 @@
                     </a:schemeClr>
                   </a:solidFill>
                 </a:rPr>
-                <a:t>        break;  // end the loop</a:t>
+                <a:t>          break;  // end the loop</a:t>
               </a:r>
             </a:p>
             <a:p>
@@ -23443,7 +23326,7 @@
                     </a:schemeClr>
                   </a:solidFill>
                 </a:rPr>
-                <a:t>    }</a:t>
+                <a:t>      }</a:t>
               </a:r>
             </a:p>
             <a:p>
@@ -25298,7 +25181,7 @@
             <p:nvPr/>
           </p:nvPicPr>
           <p:blipFill>
-            <a:blip r:embed="rId3">
+            <a:blip r:embed="rId2">
               <a:alphaModFix/>
             </a:blip>
             <a:stretch>
@@ -25487,7 +25370,7 @@
           <p:nvPr/>
         </p:nvPicPr>
         <p:blipFill>
-          <a:blip r:embed="rId4">
+          <a:blip r:embed="rId3">
             <a:alphaModFix/>
           </a:blip>
           <a:stretch>

</xml_diff>

<commit_message>
Update control flow ppt slides
</commit_message>
<xml_diff>
--- a/resources/ppt-slides/control-flow-break.pptx
+++ b/resources/ppt-slides/control-flow-break.pptx
@@ -3042,11 +3042,11 @@
               </a:pPr>
               <a:r>
                 <a:rPr lang="en-AU" sz="1600" dirty="0"/>
-                <a:t>using static </a:t>
+                <a:t/>
               </a:r>
               <a:r>
                 <a:rPr lang="en-AU" sz="1600" dirty="0" err="1"/>
-                <a:t>SplashKitSDK.SplashKit</a:t>
+                <a:t>#include "splashkit.h"</a:t>
               </a:r>
               <a:r>
                 <a:rPr lang="en-AU" sz="1600" dirty="0"/>
@@ -3067,7 +3067,7 @@
               </a:pPr>
               <a:r>
                 <a:rPr lang="en-AU" sz="1600" dirty="0" err="1"/>
-                <a:t>OpenWindow</a:t>
+                <a:t>open_window</a:t>
               </a:r>
               <a:r>
                 <a:rPr lang="en-AU" sz="1600" dirty="0"/>
@@ -3081,7 +3081,7 @@
               </a:pPr>
               <a:r>
                 <a:rPr lang="en-AU" sz="1600" dirty="0" err="1"/>
-                <a:t>ClearScreen</a:t>
+                <a:t>clear_screen</a:t>
               </a:r>
               <a:r>
                 <a:rPr lang="en-AU" sz="1600" dirty="0"/>
@@ -3089,7 +3089,7 @@
               </a:r>
               <a:r>
                 <a:rPr lang="en-AU" sz="1600" dirty="0" err="1"/>
-                <a:t>ColorWhite</a:t>
+                <a:t>color_white</a:t>
               </a:r>
               <a:r>
                 <a:rPr lang="en-AU" sz="1600" dirty="0"/>
@@ -3126,7 +3126,7 @@
                     </a:schemeClr>
                   </a:solidFill>
                 </a:rPr>
-                <a:t>QuitRequested</a:t>
+                <a:t>quit_requested</a:t>
               </a:r>
               <a:r>
                 <a:rPr lang="en-AU" sz="1600" dirty="0">
@@ -5317,7 +5317,7 @@
               </a:r>
               <a:r>
                 <a:rPr lang="en-AU" sz="1200" dirty="0" err="1"/>
-                <a:t>QuitRequested</a:t>
+                <a:t>quit_requested</a:t>
               </a:r>
               <a:r>
                 <a:rPr lang="en-AU" sz="1200" dirty="0"/>
@@ -5363,7 +5363,7 @@
                     </a:schemeClr>
                   </a:solidFill>
                 </a:rPr>
-                <a:t>FillCircle</a:t>
+                <a:t>fill_circle</a:t>
               </a:r>
               <a:r>
                 <a:rPr lang="en-AU" sz="1200" dirty="0">
@@ -5383,7 +5383,7 @@
                     </a:schemeClr>
                   </a:solidFill>
                 </a:rPr>
-                <a:t>RandomColor</a:t>
+                <a:t>random_color</a:t>
               </a:r>
               <a:r>
                 <a:rPr lang="en-AU" sz="1200" dirty="0">
@@ -5403,7 +5403,7 @@
                     </a:schemeClr>
                   </a:solidFill>
                 </a:rPr>
-                <a:t>Rnd</a:t>
+                <a:t>rnd</a:t>
               </a:r>
               <a:r>
                 <a:rPr lang="en-AU" sz="1200" dirty="0">
@@ -5423,7 +5423,7 @@
                     </a:schemeClr>
                   </a:solidFill>
                 </a:rPr>
-                <a:t>ScreenWidth</a:t>
+                <a:t>screen_width</a:t>
               </a:r>
               <a:r>
                 <a:rPr lang="en-AU" sz="1200" dirty="0">
@@ -5462,7 +5462,7 @@
                     </a:schemeClr>
                   </a:solidFill>
                 </a:rPr>
-                <a:t>Rnd</a:t>
+                <a:t>rnd</a:t>
               </a:r>
               <a:r>
                 <a:rPr lang="en-AU" sz="1200" dirty="0">
@@ -5482,7 +5482,7 @@
                     </a:schemeClr>
                   </a:solidFill>
                 </a:rPr>
-                <a:t>ScreenHeight</a:t>
+                <a:t>screen_height</a:t>
               </a:r>
               <a:r>
                 <a:rPr lang="en-AU" sz="1200" dirty="0">
@@ -5502,7 +5502,7 @@
                     </a:schemeClr>
                   </a:solidFill>
                 </a:rPr>
-                <a:t>Rnd</a:t>
+                <a:t>rnd</a:t>
               </a:r>
               <a:r>
                 <a:rPr lang="en-AU" sz="1200" dirty="0">
@@ -5538,7 +5538,7 @@
                     </a:schemeClr>
                   </a:solidFill>
                 </a:rPr>
-                <a:t>RefreshScreen</a:t>
+                <a:t>refresh_screen</a:t>
               </a:r>
               <a:r>
                 <a:rPr lang="en-AU" sz="1200" dirty="0">
@@ -5574,7 +5574,7 @@
                     </a:schemeClr>
                   </a:solidFill>
                 </a:rPr>
-                <a:t>ProcessEvents</a:t>
+                <a:t>process_events</a:t>
               </a:r>
               <a:r>
                 <a:rPr lang="en-AU" sz="1200" dirty="0">
@@ -5623,7 +5623,7 @@
                     </a:schemeClr>
                   </a:solidFill>
                 </a:rPr>
-                <a:t>KeyTyped</a:t>
+                <a:t>key_typed</a:t>
               </a:r>
               <a:r>
                 <a:rPr lang="en-AU" sz="1200" dirty="0">
@@ -5643,7 +5643,7 @@
                     </a:schemeClr>
                   </a:solidFill>
                 </a:rPr>
-                <a:t>KeyCode.EscapeKey</a:t>
+                <a:t>ESCAPE_KEY</a:t>
               </a:r>
               <a:r>
                 <a:rPr lang="en-AU" sz="1200" dirty="0">
@@ -5733,7 +5733,7 @@
                     </a:schemeClr>
                   </a:solidFill>
                 </a:rPr>
-                <a:t>WriteLine("Bye…")</a:t>
+                <a:t>write_line("Bye…")</a:t>
               </a:r>
             </a:p>
             <a:p>
@@ -7889,7 +7889,7 @@
                     </a:schemeClr>
                   </a:solidFill>
                 </a:rPr>
-                <a:t>QuitRequested</a:t>
+                <a:t>quit_requested</a:t>
               </a:r>
               <a:r>
                 <a:rPr lang="en-AU" sz="1200" dirty="0">
@@ -7929,7 +7929,7 @@
               </a:r>
               <a:r>
                 <a:rPr lang="en-AU" sz="1200" dirty="0" err="1"/>
-                <a:t>FillCircle</a:t>
+                <a:t>fill_circle</a:t>
               </a:r>
               <a:r>
                 <a:rPr lang="en-AU" sz="1200" dirty="0"/>
@@ -7937,7 +7937,7 @@
               </a:r>
               <a:r>
                 <a:rPr lang="en-AU" sz="1200" dirty="0" err="1"/>
-                <a:t>RandomColor</a:t>
+                <a:t>random_color</a:t>
               </a:r>
               <a:r>
                 <a:rPr lang="en-AU" sz="1200" dirty="0"/>
@@ -7945,7 +7945,7 @@
               </a:r>
               <a:r>
                 <a:rPr lang="en-AU" sz="1200" dirty="0" err="1"/>
-                <a:t>Rnd</a:t>
+                <a:t>rnd</a:t>
               </a:r>
               <a:r>
                 <a:rPr lang="en-AU" sz="1200" dirty="0"/>
@@ -7953,7 +7953,7 @@
               </a:r>
               <a:r>
                 <a:rPr lang="en-AU" sz="1200" dirty="0" err="1"/>
-                <a:t>ScreenWidth</a:t>
+                <a:t>screen_width</a:t>
               </a:r>
               <a:r>
                 <a:rPr lang="en-AU" sz="1200" dirty="0"/>
@@ -7968,7 +7968,7 @@
               </a:r>
               <a:r>
                 <a:rPr lang="en-AU" sz="1200" dirty="0" err="1"/>
-                <a:t>Rnd</a:t>
+                <a:t>rnd</a:t>
               </a:r>
               <a:r>
                 <a:rPr lang="en-AU" sz="1200" dirty="0"/>
@@ -7976,7 +7976,7 @@
               </a:r>
               <a:r>
                 <a:rPr lang="en-AU" sz="1200" dirty="0" err="1"/>
-                <a:t>ScreenHeight</a:t>
+                <a:t>screen_height</a:t>
               </a:r>
               <a:r>
                 <a:rPr lang="en-AU" sz="1200" dirty="0"/>
@@ -7984,7 +7984,7 @@
               </a:r>
               <a:r>
                 <a:rPr lang="en-AU" sz="1200" dirty="0" err="1"/>
-                <a:t>Rnd</a:t>
+                <a:t>rnd</a:t>
               </a:r>
               <a:r>
                 <a:rPr lang="en-AU" sz="1200" dirty="0"/>
@@ -8002,7 +8002,7 @@
               </a:r>
               <a:r>
                 <a:rPr lang="en-AU" sz="1200" dirty="0" err="1"/>
-                <a:t>RefreshScreen</a:t>
+                <a:t>refresh_screen</a:t>
               </a:r>
               <a:r>
                 <a:rPr lang="en-AU" sz="1200" dirty="0"/>
@@ -8020,7 +8020,7 @@
               </a:r>
               <a:r>
                 <a:rPr lang="en-AU" sz="1200" dirty="0" err="1"/>
-                <a:t>ProcessEvents</a:t>
+                <a:t>process_events</a:t>
               </a:r>
               <a:r>
                 <a:rPr lang="en-AU" sz="1200" dirty="0"/>
@@ -8063,7 +8063,7 @@
                     </a:schemeClr>
                   </a:solidFill>
                 </a:rPr>
-                <a:t>KeyTyped</a:t>
+                <a:t>key_typed</a:t>
               </a:r>
               <a:r>
                 <a:rPr lang="en-AU" sz="1200" dirty="0">
@@ -8083,7 +8083,7 @@
                     </a:schemeClr>
                   </a:solidFill>
                 </a:rPr>
-                <a:t>KeyCode.EscapeKey</a:t>
+                <a:t>ESCAPE_KEY</a:t>
               </a:r>
               <a:r>
                 <a:rPr lang="en-AU" sz="1200" dirty="0">
@@ -8173,7 +8173,7 @@
                     </a:schemeClr>
                   </a:solidFill>
                 </a:rPr>
-                <a:t>WriteLine("Bye…")</a:t>
+                <a:t>write_line("Bye…")</a:t>
               </a:r>
             </a:p>
           </p:txBody>
@@ -10316,7 +10316,7 @@
                     </a:schemeClr>
                   </a:solidFill>
                 </a:rPr>
-                <a:t>QuitRequested</a:t>
+                <a:t>quit_requested</a:t>
               </a:r>
               <a:r>
                 <a:rPr lang="en-AU" sz="1200" dirty="0">
@@ -10368,7 +10368,7 @@
                     </a:schemeClr>
                   </a:solidFill>
                 </a:rPr>
-                <a:t>FillCircle</a:t>
+                <a:t>fill_circle</a:t>
               </a:r>
               <a:r>
                 <a:rPr lang="en-AU" sz="1200" dirty="0">
@@ -10388,7 +10388,7 @@
                     </a:schemeClr>
                   </a:solidFill>
                 </a:rPr>
-                <a:t>RandomColor</a:t>
+                <a:t>random_color</a:t>
               </a:r>
               <a:r>
                 <a:rPr lang="en-AU" sz="1200" dirty="0">
@@ -10408,7 +10408,7 @@
                     </a:schemeClr>
                   </a:solidFill>
                 </a:rPr>
-                <a:t>Rnd</a:t>
+                <a:t>rnd</a:t>
               </a:r>
               <a:r>
                 <a:rPr lang="en-AU" sz="1200" dirty="0">
@@ -10428,7 +10428,7 @@
                     </a:schemeClr>
                   </a:solidFill>
                 </a:rPr>
-                <a:t>ScreenWidth</a:t>
+                <a:t>screen_width</a:t>
               </a:r>
               <a:r>
                 <a:rPr lang="en-AU" sz="1200" dirty="0">
@@ -10467,7 +10467,7 @@
                     </a:schemeClr>
                   </a:solidFill>
                 </a:rPr>
-                <a:t>Rnd</a:t>
+                <a:t>rnd</a:t>
               </a:r>
               <a:r>
                 <a:rPr lang="en-AU" sz="1200" dirty="0">
@@ -10487,7 +10487,7 @@
                     </a:schemeClr>
                   </a:solidFill>
                 </a:rPr>
-                <a:t>ScreenHeight</a:t>
+                <a:t>screen_height</a:t>
               </a:r>
               <a:r>
                 <a:rPr lang="en-AU" sz="1200" dirty="0">
@@ -10507,7 +10507,7 @@
                     </a:schemeClr>
                   </a:solidFill>
                 </a:rPr>
-                <a:t>Rnd</a:t>
+                <a:t>rnd</a:t>
               </a:r>
               <a:r>
                 <a:rPr lang="en-AU" sz="1200" dirty="0">
@@ -10543,7 +10543,7 @@
                     </a:schemeClr>
                   </a:solidFill>
                 </a:rPr>
-                <a:t>RefreshScreen</a:t>
+                <a:t>refresh_screen</a:t>
               </a:r>
               <a:r>
                 <a:rPr lang="en-AU" sz="1200" dirty="0">
@@ -10579,7 +10579,7 @@
                     </a:schemeClr>
                   </a:solidFill>
                 </a:rPr>
-                <a:t>ProcessEvents</a:t>
+                <a:t>process_events</a:t>
               </a:r>
               <a:r>
                 <a:rPr lang="en-AU" sz="1200" dirty="0">
@@ -10616,7 +10616,7 @@
               </a:r>
               <a:r>
                 <a:rPr lang="en-AU" sz="1200" dirty="0" err="1"/>
-                <a:t>KeyTyped</a:t>
+                <a:t>key_typed</a:t>
               </a:r>
               <a:r>
                 <a:rPr lang="en-AU" sz="1200" dirty="0"/>
@@ -10624,7 +10624,7 @@
               </a:r>
               <a:r>
                 <a:rPr lang="en-AU" sz="1200" dirty="0" err="1"/>
-                <a:t>KeyCode.EscapeKey</a:t>
+                <a:t>ESCAPE_KEY</a:t>
               </a:r>
               <a:r>
                 <a:rPr lang="en-AU" sz="1200" dirty="0"/>
@@ -10708,7 +10708,7 @@
                     </a:schemeClr>
                   </a:solidFill>
                 </a:rPr>
-                <a:t>WriteLine("Bye…")</a:t>
+                <a:t>write_line("Bye…")</a:t>
               </a:r>
             </a:p>
           </p:txBody>
@@ -12839,7 +12839,7 @@
               </a:r>
               <a:r>
                 <a:rPr lang="en-AU" sz="1200" dirty="0" err="1"/>
-                <a:t>QuitRequested</a:t>
+                <a:t>quit_requested</a:t>
               </a:r>
               <a:r>
                 <a:rPr lang="en-AU" sz="1200" dirty="0"/>
@@ -12885,7 +12885,7 @@
                     </a:schemeClr>
                   </a:solidFill>
                 </a:rPr>
-                <a:t>FillCircle</a:t>
+                <a:t>fill_circle</a:t>
               </a:r>
               <a:r>
                 <a:rPr lang="en-AU" sz="1200" dirty="0">
@@ -12905,7 +12905,7 @@
                     </a:schemeClr>
                   </a:solidFill>
                 </a:rPr>
-                <a:t>RandomColor</a:t>
+                <a:t>random_color</a:t>
               </a:r>
               <a:r>
                 <a:rPr lang="en-AU" sz="1200" dirty="0">
@@ -12925,7 +12925,7 @@
                     </a:schemeClr>
                   </a:solidFill>
                 </a:rPr>
-                <a:t>Rnd</a:t>
+                <a:t>rnd</a:t>
               </a:r>
               <a:r>
                 <a:rPr lang="en-AU" sz="1200" dirty="0">
@@ -12945,7 +12945,7 @@
                     </a:schemeClr>
                   </a:solidFill>
                 </a:rPr>
-                <a:t>ScreenWidth</a:t>
+                <a:t>screen_width</a:t>
               </a:r>
               <a:r>
                 <a:rPr lang="en-AU" sz="1200" dirty="0">
@@ -12984,7 +12984,7 @@
                     </a:schemeClr>
                   </a:solidFill>
                 </a:rPr>
-                <a:t>Rnd</a:t>
+                <a:t>rnd</a:t>
               </a:r>
               <a:r>
                 <a:rPr lang="en-AU" sz="1200" dirty="0">
@@ -13004,7 +13004,7 @@
                     </a:schemeClr>
                   </a:solidFill>
                 </a:rPr>
-                <a:t>ScreenHeight</a:t>
+                <a:t>screen_height</a:t>
               </a:r>
               <a:r>
                 <a:rPr lang="en-AU" sz="1200" dirty="0">
@@ -13024,7 +13024,7 @@
                     </a:schemeClr>
                   </a:solidFill>
                 </a:rPr>
-                <a:t>Rnd</a:t>
+                <a:t>rnd</a:t>
               </a:r>
               <a:r>
                 <a:rPr lang="en-AU" sz="1200" dirty="0">
@@ -13060,7 +13060,7 @@
                     </a:schemeClr>
                   </a:solidFill>
                 </a:rPr>
-                <a:t>RefreshScreen</a:t>
+                <a:t>refresh_screen</a:t>
               </a:r>
               <a:r>
                 <a:rPr lang="en-AU" sz="1200" dirty="0">
@@ -13096,7 +13096,7 @@
                     </a:schemeClr>
                   </a:solidFill>
                 </a:rPr>
-                <a:t>ProcessEvents</a:t>
+                <a:t>process_events</a:t>
               </a:r>
               <a:r>
                 <a:rPr lang="en-AU" sz="1200" dirty="0">
@@ -13145,7 +13145,7 @@
                     </a:schemeClr>
                   </a:solidFill>
                 </a:rPr>
-                <a:t>KeyTyped</a:t>
+                <a:t>key_typed</a:t>
               </a:r>
               <a:r>
                 <a:rPr lang="en-AU" sz="1200" dirty="0">
@@ -13165,7 +13165,7 @@
                     </a:schemeClr>
                   </a:solidFill>
                 </a:rPr>
-                <a:t>KeyCode.EscapeKey</a:t>
+                <a:t>ESCAPE_KEY</a:t>
               </a:r>
               <a:r>
                 <a:rPr lang="en-AU" sz="1200" dirty="0">
@@ -13255,7 +13255,7 @@
                     </a:schemeClr>
                   </a:solidFill>
                 </a:rPr>
-                <a:t>WriteLine("Bye…")</a:t>
+                <a:t>write_line("Bye…")</a:t>
               </a:r>
             </a:p>
           </p:txBody>
@@ -15398,7 +15398,7 @@
                     </a:schemeClr>
                   </a:solidFill>
                 </a:rPr>
-                <a:t>QuitRequested</a:t>
+                <a:t>quit_requested</a:t>
               </a:r>
               <a:r>
                 <a:rPr lang="en-AU" sz="1200" dirty="0">
@@ -15438,7 +15438,7 @@
               </a:r>
               <a:r>
                 <a:rPr lang="en-AU" sz="1200" dirty="0" err="1"/>
-                <a:t>FillCircle</a:t>
+                <a:t>fill_circle</a:t>
               </a:r>
               <a:r>
                 <a:rPr lang="en-AU" sz="1200" dirty="0"/>
@@ -15446,7 +15446,7 @@
               </a:r>
               <a:r>
                 <a:rPr lang="en-AU" sz="1200" dirty="0" err="1"/>
-                <a:t>RandomColor</a:t>
+                <a:t>random_color</a:t>
               </a:r>
               <a:r>
                 <a:rPr lang="en-AU" sz="1200" dirty="0"/>
@@ -15454,7 +15454,7 @@
               </a:r>
               <a:r>
                 <a:rPr lang="en-AU" sz="1200" dirty="0" err="1"/>
-                <a:t>Rnd</a:t>
+                <a:t>rnd</a:t>
               </a:r>
               <a:r>
                 <a:rPr lang="en-AU" sz="1200" dirty="0"/>
@@ -15462,7 +15462,7 @@
               </a:r>
               <a:r>
                 <a:rPr lang="en-AU" sz="1200" dirty="0" err="1"/>
-                <a:t>ScreenWidth</a:t>
+                <a:t>screen_width</a:t>
               </a:r>
               <a:r>
                 <a:rPr lang="en-AU" sz="1200" dirty="0"/>
@@ -15477,7 +15477,7 @@
               </a:r>
               <a:r>
                 <a:rPr lang="en-AU" sz="1200" dirty="0" err="1"/>
-                <a:t>Rnd</a:t>
+                <a:t>rnd</a:t>
               </a:r>
               <a:r>
                 <a:rPr lang="en-AU" sz="1200" dirty="0"/>
@@ -15485,7 +15485,7 @@
               </a:r>
               <a:r>
                 <a:rPr lang="en-AU" sz="1200" dirty="0" err="1"/>
-                <a:t>ScreenHeight</a:t>
+                <a:t>screen_height</a:t>
               </a:r>
               <a:r>
                 <a:rPr lang="en-AU" sz="1200" dirty="0"/>
@@ -15493,7 +15493,7 @@
               </a:r>
               <a:r>
                 <a:rPr lang="en-AU" sz="1200" dirty="0" err="1"/>
-                <a:t>Rnd</a:t>
+                <a:t>rnd</a:t>
               </a:r>
               <a:r>
                 <a:rPr lang="en-AU" sz="1200" dirty="0"/>
@@ -15511,7 +15511,7 @@
               </a:r>
               <a:r>
                 <a:rPr lang="en-AU" sz="1200" dirty="0" err="1"/>
-                <a:t>RefreshScreen</a:t>
+                <a:t>refresh_screen</a:t>
               </a:r>
               <a:r>
                 <a:rPr lang="en-AU" sz="1200" dirty="0"/>
@@ -15529,7 +15529,7 @@
               </a:r>
               <a:r>
                 <a:rPr lang="en-AU" sz="1200" dirty="0" err="1"/>
-                <a:t>ProcessEvents</a:t>
+                <a:t>process_events</a:t>
               </a:r>
               <a:r>
                 <a:rPr lang="en-AU" sz="1200" dirty="0"/>
@@ -15572,7 +15572,7 @@
                     </a:schemeClr>
                   </a:solidFill>
                 </a:rPr>
-                <a:t>KeyTyped</a:t>
+                <a:t>key_typed</a:t>
               </a:r>
               <a:r>
                 <a:rPr lang="en-AU" sz="1200" dirty="0">
@@ -15592,7 +15592,7 @@
                     </a:schemeClr>
                   </a:solidFill>
                 </a:rPr>
-                <a:t>KeyCode.EscapeKey</a:t>
+                <a:t>ESCAPE_KEY</a:t>
               </a:r>
               <a:r>
                 <a:rPr lang="en-AU" sz="1200" dirty="0">
@@ -15682,7 +15682,7 @@
                     </a:schemeClr>
                   </a:solidFill>
                 </a:rPr>
-                <a:t>WriteLine("Bye…")</a:t>
+                <a:t>write_line("Bye…")</a:t>
               </a:r>
             </a:p>
             <a:p>
@@ -17838,7 +17838,7 @@
                     </a:schemeClr>
                   </a:solidFill>
                 </a:rPr>
-                <a:t>QuitRequested</a:t>
+                <a:t>quit_requested</a:t>
               </a:r>
               <a:r>
                 <a:rPr lang="en-AU" sz="1200" dirty="0">
@@ -17890,7 +17890,7 @@
                     </a:schemeClr>
                   </a:solidFill>
                 </a:rPr>
-                <a:t>FillCircle</a:t>
+                <a:t>fill_circle</a:t>
               </a:r>
               <a:r>
                 <a:rPr lang="en-AU" sz="1200" dirty="0">
@@ -17910,7 +17910,7 @@
                     </a:schemeClr>
                   </a:solidFill>
                 </a:rPr>
-                <a:t>RandomColor</a:t>
+                <a:t>random_color</a:t>
               </a:r>
               <a:r>
                 <a:rPr lang="en-AU" sz="1200" dirty="0">
@@ -17930,7 +17930,7 @@
                     </a:schemeClr>
                   </a:solidFill>
                 </a:rPr>
-                <a:t>Rnd</a:t>
+                <a:t>rnd</a:t>
               </a:r>
               <a:r>
                 <a:rPr lang="en-AU" sz="1200" dirty="0">
@@ -17950,7 +17950,7 @@
                     </a:schemeClr>
                   </a:solidFill>
                 </a:rPr>
-                <a:t>ScreenWidth</a:t>
+                <a:t>screen_width</a:t>
               </a:r>
               <a:r>
                 <a:rPr lang="en-AU" sz="1200" dirty="0">
@@ -17989,7 +17989,7 @@
                     </a:schemeClr>
                   </a:solidFill>
                 </a:rPr>
-                <a:t>Rnd</a:t>
+                <a:t>rnd</a:t>
               </a:r>
               <a:r>
                 <a:rPr lang="en-AU" sz="1200" dirty="0">
@@ -18009,7 +18009,7 @@
                     </a:schemeClr>
                   </a:solidFill>
                 </a:rPr>
-                <a:t>ScreenHeight</a:t>
+                <a:t>screen_height</a:t>
               </a:r>
               <a:r>
                 <a:rPr lang="en-AU" sz="1200" dirty="0">
@@ -18029,7 +18029,7 @@
                     </a:schemeClr>
                   </a:solidFill>
                 </a:rPr>
-                <a:t>Rnd</a:t>
+                <a:t>rnd</a:t>
               </a:r>
               <a:r>
                 <a:rPr lang="en-AU" sz="1200" dirty="0">
@@ -18065,7 +18065,7 @@
                     </a:schemeClr>
                   </a:solidFill>
                 </a:rPr>
-                <a:t>RefreshScreen</a:t>
+                <a:t>refresh_screen</a:t>
               </a:r>
               <a:r>
                 <a:rPr lang="en-AU" sz="1200" dirty="0">
@@ -18101,7 +18101,7 @@
                     </a:schemeClr>
                   </a:solidFill>
                 </a:rPr>
-                <a:t>ProcessEvents</a:t>
+                <a:t>process_events</a:t>
               </a:r>
               <a:r>
                 <a:rPr lang="en-AU" sz="1200" dirty="0">
@@ -18138,7 +18138,7 @@
               </a:r>
               <a:r>
                 <a:rPr lang="en-AU" sz="1200" dirty="0" err="1"/>
-                <a:t>KeyTyped</a:t>
+                <a:t>key_typed</a:t>
               </a:r>
               <a:r>
                 <a:rPr lang="en-AU" sz="1200" dirty="0"/>
@@ -18146,7 +18146,7 @@
               </a:r>
               <a:r>
                 <a:rPr lang="en-AU" sz="1200" dirty="0" err="1"/>
-                <a:t>KeyCode.EscapeKey</a:t>
+                <a:t>ESCAPE_KEY</a:t>
               </a:r>
               <a:r>
                 <a:rPr lang="en-AU" sz="1200" dirty="0"/>
@@ -18230,7 +18230,7 @@
                     </a:schemeClr>
                   </a:solidFill>
                 </a:rPr>
-                <a:t>WriteLine("Bye…")</a:t>
+                <a:t>write_line("Bye…")</a:t>
               </a:r>
             </a:p>
           </p:txBody>
@@ -20373,7 +20373,7 @@
                     </a:schemeClr>
                   </a:solidFill>
                 </a:rPr>
-                <a:t>QuitRequested</a:t>
+                <a:t>quit_requested</a:t>
               </a:r>
               <a:r>
                 <a:rPr lang="en-AU" sz="1200" dirty="0">
@@ -20425,7 +20425,7 @@
                     </a:schemeClr>
                   </a:solidFill>
                 </a:rPr>
-                <a:t>FillCircle</a:t>
+                <a:t>fill_circle</a:t>
               </a:r>
               <a:r>
                 <a:rPr lang="en-AU" sz="1200" dirty="0">
@@ -20445,7 +20445,7 @@
                     </a:schemeClr>
                   </a:solidFill>
                 </a:rPr>
-                <a:t>RandomColor</a:t>
+                <a:t>random_color</a:t>
               </a:r>
               <a:r>
                 <a:rPr lang="en-AU" sz="1200" dirty="0">
@@ -20465,7 +20465,7 @@
                     </a:schemeClr>
                   </a:solidFill>
                 </a:rPr>
-                <a:t>Rnd</a:t>
+                <a:t>rnd</a:t>
               </a:r>
               <a:r>
                 <a:rPr lang="en-AU" sz="1200" dirty="0">
@@ -20485,7 +20485,7 @@
                     </a:schemeClr>
                   </a:solidFill>
                 </a:rPr>
-                <a:t>ScreenWidth</a:t>
+                <a:t>screen_width</a:t>
               </a:r>
               <a:r>
                 <a:rPr lang="en-AU" sz="1200" dirty="0">
@@ -20524,7 +20524,7 @@
                     </a:schemeClr>
                   </a:solidFill>
                 </a:rPr>
-                <a:t>Rnd</a:t>
+                <a:t>rnd</a:t>
               </a:r>
               <a:r>
                 <a:rPr lang="en-AU" sz="1200" dirty="0">
@@ -20544,7 +20544,7 @@
                     </a:schemeClr>
                   </a:solidFill>
                 </a:rPr>
-                <a:t>ScreenHeight</a:t>
+                <a:t>screen_height</a:t>
               </a:r>
               <a:r>
                 <a:rPr lang="en-AU" sz="1200" dirty="0">
@@ -20564,7 +20564,7 @@
                     </a:schemeClr>
                   </a:solidFill>
                 </a:rPr>
-                <a:t>Rnd</a:t>
+                <a:t>rnd</a:t>
               </a:r>
               <a:r>
                 <a:rPr lang="en-AU" sz="1200" dirty="0">
@@ -20600,7 +20600,7 @@
                     </a:schemeClr>
                   </a:solidFill>
                 </a:rPr>
-                <a:t>RefreshScreen</a:t>
+                <a:t>refresh_screen</a:t>
               </a:r>
               <a:r>
                 <a:rPr lang="en-AU" sz="1200" dirty="0">
@@ -20636,7 +20636,7 @@
                     </a:schemeClr>
                   </a:solidFill>
                 </a:rPr>
-                <a:t>ProcessEvents</a:t>
+                <a:t>process_events</a:t>
               </a:r>
               <a:r>
                 <a:rPr lang="en-AU" sz="1200" dirty="0">
@@ -20685,7 +20685,7 @@
                     </a:schemeClr>
                   </a:solidFill>
                 </a:rPr>
-                <a:t>KeyTyped</a:t>
+                <a:t>key_typed</a:t>
               </a:r>
               <a:r>
                 <a:rPr lang="en-AU" sz="1200" dirty="0">
@@ -20705,7 +20705,7 @@
                     </a:schemeClr>
                   </a:solidFill>
                 </a:rPr>
-                <a:t>KeyCode.EscapeKey</a:t>
+                <a:t>ESCAPE_KEY</a:t>
               </a:r>
               <a:r>
                 <a:rPr lang="en-AU" sz="1200" dirty="0">
@@ -20789,7 +20789,7 @@
                     </a:schemeClr>
                   </a:solidFill>
                 </a:rPr>
-                <a:t>WriteLine("Bye…")</a:t>
+                <a:t>write_line("Bye…")</a:t>
               </a:r>
             </a:p>
           </p:txBody>
@@ -22936,7 +22936,7 @@
                     </a:schemeClr>
                   </a:solidFill>
                 </a:rPr>
-                <a:t>QuitRequested</a:t>
+                <a:t>quit_requested</a:t>
               </a:r>
               <a:r>
                 <a:rPr lang="en-AU" sz="1200" dirty="0">
@@ -22988,7 +22988,7 @@
                     </a:schemeClr>
                   </a:solidFill>
                 </a:rPr>
-                <a:t>FillCircle</a:t>
+                <a:t>fill_circle</a:t>
               </a:r>
               <a:r>
                 <a:rPr lang="en-AU" sz="1200" dirty="0">
@@ -23008,7 +23008,7 @@
                     </a:schemeClr>
                   </a:solidFill>
                 </a:rPr>
-                <a:t>RandomColor</a:t>
+                <a:t>random_color</a:t>
               </a:r>
               <a:r>
                 <a:rPr lang="en-AU" sz="1200" dirty="0">
@@ -23028,7 +23028,7 @@
                     </a:schemeClr>
                   </a:solidFill>
                 </a:rPr>
-                <a:t>Rnd</a:t>
+                <a:t>rnd</a:t>
               </a:r>
               <a:r>
                 <a:rPr lang="en-AU" sz="1200" dirty="0">
@@ -23048,7 +23048,7 @@
                     </a:schemeClr>
                   </a:solidFill>
                 </a:rPr>
-                <a:t>ScreenWidth</a:t>
+                <a:t>screen_width</a:t>
               </a:r>
               <a:r>
                 <a:rPr lang="en-AU" sz="1200" dirty="0">
@@ -23087,7 +23087,7 @@
                     </a:schemeClr>
                   </a:solidFill>
                 </a:rPr>
-                <a:t>Rnd</a:t>
+                <a:t>rnd</a:t>
               </a:r>
               <a:r>
                 <a:rPr lang="en-AU" sz="1200" dirty="0">
@@ -23107,7 +23107,7 @@
                     </a:schemeClr>
                   </a:solidFill>
                 </a:rPr>
-                <a:t>ScreenHeight</a:t>
+                <a:t>screen_height</a:t>
               </a:r>
               <a:r>
                 <a:rPr lang="en-AU" sz="1200" dirty="0">
@@ -23127,7 +23127,7 @@
                     </a:schemeClr>
                   </a:solidFill>
                 </a:rPr>
-                <a:t>Rnd</a:t>
+                <a:t>rnd</a:t>
               </a:r>
               <a:r>
                 <a:rPr lang="en-AU" sz="1200" dirty="0">
@@ -23163,7 +23163,7 @@
                     </a:schemeClr>
                   </a:solidFill>
                 </a:rPr>
-                <a:t>RefreshScreen</a:t>
+                <a:t>refresh_screen</a:t>
               </a:r>
               <a:r>
                 <a:rPr lang="en-AU" sz="1200" dirty="0">
@@ -23199,7 +23199,7 @@
                     </a:schemeClr>
                   </a:solidFill>
                 </a:rPr>
-                <a:t>ProcessEvents</a:t>
+                <a:t>process_events</a:t>
               </a:r>
               <a:r>
                 <a:rPr lang="en-AU" sz="1200" dirty="0">
@@ -23248,7 +23248,7 @@
                     </a:schemeClr>
                   </a:solidFill>
                 </a:rPr>
-                <a:t>KeyTyped</a:t>
+                <a:t>key_typed</a:t>
               </a:r>
               <a:r>
                 <a:rPr lang="en-AU" sz="1200" dirty="0">
@@ -23268,7 +23268,7 @@
                     </a:schemeClr>
                   </a:solidFill>
                 </a:rPr>
-                <a:t>KeyCode.EscapeKey</a:t>
+                <a:t>ESCAPE_KEY</a:t>
               </a:r>
               <a:r>
                 <a:rPr lang="en-AU" sz="1200" dirty="0">
@@ -23352,7 +23352,7 @@
               </a:pPr>
               <a:r>
                 <a:rPr lang="en-AU" sz="1200" dirty="0"/>
-                <a:t>WriteLine("Bye…")</a:t>
+                <a:t>write_line("Bye…")</a:t>
               </a:r>
             </a:p>
           </p:txBody>

</xml_diff>